<commit_message>
Insert Data In Database
</commit_message>
<xml_diff>
--- a/.lessons/16 Fundamental. Database - Query Builder/5 Insert Data In Database/1.pptx
+++ b/.lessons/16 Fundamental. Database - Query Builder/5 Insert Data In Database/1.pptx
@@ -10,6 +10,8 @@
     <p:sldId id="398" r:id="rId4"/>
     <p:sldId id="399" r:id="rId5"/>
     <p:sldId id="400" r:id="rId6"/>
+    <p:sldId id="401" r:id="rId7"/>
+    <p:sldId id="402" r:id="rId8"/>
   </p:sldIdLst>
   <p:sldSz cx="12192000" cy="6858000"/>
   <p:notesSz cx="6858000" cy="9144000"/>
@@ -263,7 +265,7 @@
           <a:p>
             <a:fld id="{3E102D2E-813C-461C-9963-687A650C48C0}" type="datetimeFigureOut">
               <a:rPr lang="en-US" smtClean="0"/>
-              <a:t>4/22/2025</a:t>
+              <a:t>4/23/2025</a:t>
             </a:fld>
             <a:endParaRPr lang="en-US"/>
           </a:p>
@@ -461,7 +463,7 @@
           <a:p>
             <a:fld id="{3E102D2E-813C-461C-9963-687A650C48C0}" type="datetimeFigureOut">
               <a:rPr lang="en-US" smtClean="0"/>
-              <a:t>4/22/2025</a:t>
+              <a:t>4/23/2025</a:t>
             </a:fld>
             <a:endParaRPr lang="en-US"/>
           </a:p>
@@ -669,7 +671,7 @@
           <a:p>
             <a:fld id="{3E102D2E-813C-461C-9963-687A650C48C0}" type="datetimeFigureOut">
               <a:rPr lang="en-US" smtClean="0"/>
-              <a:t>4/22/2025</a:t>
+              <a:t>4/23/2025</a:t>
             </a:fld>
             <a:endParaRPr lang="en-US"/>
           </a:p>
@@ -867,7 +869,7 @@
           <a:p>
             <a:fld id="{3E102D2E-813C-461C-9963-687A650C48C0}" type="datetimeFigureOut">
               <a:rPr lang="en-US" smtClean="0"/>
-              <a:t>4/22/2025</a:t>
+              <a:t>4/23/2025</a:t>
             </a:fld>
             <a:endParaRPr lang="en-US"/>
           </a:p>
@@ -1142,7 +1144,7 @@
           <a:p>
             <a:fld id="{3E102D2E-813C-461C-9963-687A650C48C0}" type="datetimeFigureOut">
               <a:rPr lang="en-US" smtClean="0"/>
-              <a:t>4/22/2025</a:t>
+              <a:t>4/23/2025</a:t>
             </a:fld>
             <a:endParaRPr lang="en-US"/>
           </a:p>
@@ -1407,7 +1409,7 @@
           <a:p>
             <a:fld id="{3E102D2E-813C-461C-9963-687A650C48C0}" type="datetimeFigureOut">
               <a:rPr lang="en-US" smtClean="0"/>
-              <a:t>4/22/2025</a:t>
+              <a:t>4/23/2025</a:t>
             </a:fld>
             <a:endParaRPr lang="en-US"/>
           </a:p>
@@ -1819,7 +1821,7 @@
           <a:p>
             <a:fld id="{3E102D2E-813C-461C-9963-687A650C48C0}" type="datetimeFigureOut">
               <a:rPr lang="en-US" smtClean="0"/>
-              <a:t>4/22/2025</a:t>
+              <a:t>4/23/2025</a:t>
             </a:fld>
             <a:endParaRPr lang="en-US"/>
           </a:p>
@@ -1960,7 +1962,7 @@
           <a:p>
             <a:fld id="{3E102D2E-813C-461C-9963-687A650C48C0}" type="datetimeFigureOut">
               <a:rPr lang="en-US" smtClean="0"/>
-              <a:t>4/22/2025</a:t>
+              <a:t>4/23/2025</a:t>
             </a:fld>
             <a:endParaRPr lang="en-US"/>
           </a:p>
@@ -2073,7 +2075,7 @@
           <a:p>
             <a:fld id="{3E102D2E-813C-461C-9963-687A650C48C0}" type="datetimeFigureOut">
               <a:rPr lang="en-US" smtClean="0"/>
-              <a:t>4/22/2025</a:t>
+              <a:t>4/23/2025</a:t>
             </a:fld>
             <a:endParaRPr lang="en-US"/>
           </a:p>
@@ -2384,7 +2386,7 @@
           <a:p>
             <a:fld id="{3E102D2E-813C-461C-9963-687A650C48C0}" type="datetimeFigureOut">
               <a:rPr lang="en-US" smtClean="0"/>
-              <a:t>4/22/2025</a:t>
+              <a:t>4/23/2025</a:t>
             </a:fld>
             <a:endParaRPr lang="en-US"/>
           </a:p>
@@ -2672,7 +2674,7 @@
           <a:p>
             <a:fld id="{3E102D2E-813C-461C-9963-687A650C48C0}" type="datetimeFigureOut">
               <a:rPr lang="en-US" smtClean="0"/>
-              <a:t>4/22/2025</a:t>
+              <a:t>4/23/2025</a:t>
             </a:fld>
             <a:endParaRPr lang="en-US"/>
           </a:p>
@@ -2913,7 +2915,7 @@
           <a:p>
             <a:fld id="{3E102D2E-813C-461C-9963-687A650C48C0}" type="datetimeFigureOut">
               <a:rPr lang="en-US" smtClean="0"/>
-              <a:t>4/22/2025</a:t>
+              <a:t>4/23/2025</a:t>
             </a:fld>
             <a:endParaRPr lang="en-US"/>
           </a:p>
@@ -3351,7 +3353,7 @@
         <p:spPr>
           <a:xfrm>
             <a:off x="217714" y="255046"/>
-            <a:ext cx="11756571" cy="355354"/>
+            <a:ext cx="11756571" cy="1255600"/>
           </a:xfrm>
           <a:prstGeom prst="rect">
             <a:avLst/>
@@ -3371,6 +3373,19 @@
               <a:buNone/>
             </a:pPr>
             <a:r>
+              <a:rPr kumimoji="0" lang="en-US" altLang="en-US" sz="1300" b="1" i="0" u="none" strike="noStrike" cap="none" normalizeH="0" baseline="0">
+                <a:ln>
+                  <a:noFill/>
+                </a:ln>
+                <a:solidFill>
+                  <a:srgbClr val="FF0000"/>
+                </a:solidFill>
+                <a:effectLst/>
+                <a:latin typeface="Arial" panose="020B0604020202020204" pitchFamily="34" charset="0"/>
+              </a:rPr>
+              <a:t>insert() </a:t>
+            </a:r>
+            <a:r>
               <a:rPr kumimoji="0" lang="en-US" altLang="en-US" sz="1300" b="0" i="0" u="none" strike="noStrike" cap="none" normalizeH="0" baseline="0">
                 <a:ln>
                   <a:noFill/>
@@ -3381,11 +3396,207 @@
                 <a:effectLst/>
                 <a:latin typeface="Arial" panose="020B0604020202020204" pitchFamily="34" charset="0"/>
               </a:rPr>
-              <a:t>.</a:t>
-            </a:r>
-          </a:p>
-        </p:txBody>
-      </p:sp>
+              <a:t>Laravel Query Builder-in metodu olub, verilənlər bazasına (</a:t>
+            </a:r>
+            <a:r>
+              <a:rPr kumimoji="0" lang="en-US" altLang="en-US" sz="1300" b="1" i="0" u="none" strike="noStrike" cap="none" normalizeH="0" baseline="0">
+                <a:ln>
+                  <a:noFill/>
+                </a:ln>
+                <a:solidFill>
+                  <a:schemeClr val="tx1"/>
+                </a:solidFill>
+                <a:effectLst/>
+                <a:latin typeface="Arial" panose="020B0604020202020204" pitchFamily="34" charset="0"/>
+              </a:rPr>
+              <a:t>database</a:t>
+            </a:r>
+            <a:r>
+              <a:rPr kumimoji="0" lang="en-US" altLang="en-US" sz="1300" b="0" i="0" u="none" strike="noStrike" cap="none" normalizeH="0" baseline="0">
+                <a:ln>
+                  <a:noFill/>
+                </a:ln>
+                <a:solidFill>
+                  <a:schemeClr val="tx1"/>
+                </a:solidFill>
+                <a:effectLst/>
+                <a:latin typeface="Arial" panose="020B0604020202020204" pitchFamily="34" charset="0"/>
+              </a:rPr>
+              <a:t>) yeni məlumat (</a:t>
+            </a:r>
+            <a:r>
+              <a:rPr kumimoji="0" lang="en-US" altLang="en-US" sz="1300" b="1" i="0" u="none" strike="noStrike" cap="none" normalizeH="0" baseline="0">
+                <a:ln>
+                  <a:noFill/>
+                </a:ln>
+                <a:solidFill>
+                  <a:schemeClr val="tx1"/>
+                </a:solidFill>
+                <a:effectLst/>
+                <a:latin typeface="Arial" panose="020B0604020202020204" pitchFamily="34" charset="0"/>
+              </a:rPr>
+              <a:t>record</a:t>
+            </a:r>
+            <a:r>
+              <a:rPr kumimoji="0" lang="en-US" altLang="en-US" sz="1300" b="0" i="0" u="none" strike="noStrike" cap="none" normalizeH="0" baseline="0">
+                <a:ln>
+                  <a:noFill/>
+                </a:ln>
+                <a:solidFill>
+                  <a:schemeClr val="tx1"/>
+                </a:solidFill>
+                <a:effectLst/>
+                <a:latin typeface="Arial" panose="020B0604020202020204" pitchFamily="34" charset="0"/>
+              </a:rPr>
+              <a:t>/sətir) əlavə etmək üçün istifadə olunur.</a:t>
+            </a:r>
+          </a:p>
+          <a:p>
+            <a:pPr>
+              <a:lnSpc>
+                <a:spcPct val="150000"/>
+              </a:lnSpc>
+              <a:buNone/>
+            </a:pPr>
+            <a:endParaRPr kumimoji="0" lang="en-US" altLang="en-US" sz="1300" b="0" i="0" u="none" strike="noStrike" cap="none" normalizeH="0" baseline="0">
+              <a:ln>
+                <a:noFill/>
+              </a:ln>
+              <a:solidFill>
+                <a:schemeClr val="tx1"/>
+              </a:solidFill>
+              <a:effectLst/>
+              <a:latin typeface="Arial" panose="020B0604020202020204" pitchFamily="34" charset="0"/>
+            </a:endParaRPr>
+          </a:p>
+          <a:p>
+            <a:pPr>
+              <a:lnSpc>
+                <a:spcPct val="150000"/>
+              </a:lnSpc>
+              <a:buNone/>
+            </a:pPr>
+            <a:r>
+              <a:rPr kumimoji="0" lang="en-US" altLang="en-US" sz="1300" b="0" i="0" u="none" strike="noStrike" cap="none" normalizeH="0" baseline="0">
+                <a:ln>
+                  <a:noFill/>
+                </a:ln>
+                <a:solidFill>
+                  <a:schemeClr val="tx1"/>
+                </a:solidFill>
+                <a:effectLst/>
+                <a:latin typeface="Arial" panose="020B0604020202020204" pitchFamily="34" charset="0"/>
+              </a:rPr>
+              <a:t>Bu metod vasitəsilə bir və ya daha çox sətiri table-a əlavə edə bilərik.</a:t>
+            </a:r>
+            <a:r>
+              <a:rPr kumimoji="0" lang="az-Latn-AZ" altLang="en-US" sz="1300" b="0" i="0" u="none" strike="noStrike" cap="none" normalizeH="0" baseline="0">
+                <a:ln>
+                  <a:noFill/>
+                </a:ln>
+                <a:solidFill>
+                  <a:schemeClr val="tx1"/>
+                </a:solidFill>
+                <a:effectLst/>
+                <a:latin typeface="Arial" panose="020B0604020202020204" pitchFamily="34" charset="0"/>
+              </a:rPr>
+              <a:t> Bir sətr əlavə etdikdə </a:t>
+            </a:r>
+            <a:r>
+              <a:rPr kumimoji="0" lang="az-Latn-AZ" altLang="en-US" sz="1300" b="1" i="0" u="none" strike="noStrike" cap="none" normalizeH="0" baseline="0">
+                <a:ln>
+                  <a:noFill/>
+                </a:ln>
+                <a:solidFill>
+                  <a:schemeClr val="tx1"/>
+                </a:solidFill>
+                <a:effectLst/>
+                <a:latin typeface="Arial" panose="020B0604020202020204" pitchFamily="34" charset="0"/>
+              </a:rPr>
+              <a:t>bir ARRAY </a:t>
+            </a:r>
+            <a:r>
+              <a:rPr kumimoji="0" lang="az-Latn-AZ" altLang="en-US" sz="1300" b="0" i="0" u="none" strike="noStrike" cap="none" normalizeH="0" baseline="0">
+                <a:ln>
+                  <a:noFill/>
+                </a:ln>
+                <a:solidFill>
+                  <a:schemeClr val="tx1"/>
+                </a:solidFill>
+                <a:effectLst/>
+                <a:latin typeface="Arial" panose="020B0604020202020204" pitchFamily="34" charset="0"/>
+              </a:rPr>
+              <a:t>içində çoxlu data əlavə etdikdə </a:t>
+            </a:r>
+            <a:r>
+              <a:rPr kumimoji="0" lang="az-Latn-AZ" altLang="en-US" sz="1300" b="1" i="0" u="none" strike="noStrike" cap="none" normalizeH="0" baseline="0">
+                <a:ln>
+                  <a:noFill/>
+                </a:ln>
+                <a:solidFill>
+                  <a:schemeClr val="tx1"/>
+                </a:solidFill>
+                <a:effectLst/>
+                <a:latin typeface="Arial" panose="020B0604020202020204" pitchFamily="34" charset="0"/>
+              </a:rPr>
+              <a:t>Multi array </a:t>
+            </a:r>
+            <a:r>
+              <a:rPr kumimoji="0" lang="az-Latn-AZ" altLang="en-US" sz="1300" b="0" i="0" u="none" strike="noStrike" cap="none" normalizeH="0" baseline="0">
+                <a:ln>
+                  <a:noFill/>
+                </a:ln>
+                <a:solidFill>
+                  <a:schemeClr val="tx1"/>
+                </a:solidFill>
+                <a:effectLst/>
+                <a:latin typeface="Arial" panose="020B0604020202020204" pitchFamily="34" charset="0"/>
+              </a:rPr>
+              <a:t>kimi yazılmalıdır məlumatlar.</a:t>
+            </a:r>
+            <a:endParaRPr kumimoji="0" lang="en-US" altLang="en-US" sz="1300" b="0" i="0" u="none" strike="noStrike" cap="none" normalizeH="0" baseline="0">
+              <a:ln>
+                <a:noFill/>
+              </a:ln>
+              <a:solidFill>
+                <a:schemeClr val="tx1"/>
+              </a:solidFill>
+              <a:effectLst/>
+              <a:latin typeface="Arial" panose="020B0604020202020204" pitchFamily="34" charset="0"/>
+            </a:endParaRPr>
+          </a:p>
+        </p:txBody>
+      </p:sp>
+      <p:pic>
+        <p:nvPicPr>
+          <p:cNvPr id="5" name="Picture 4">
+            <a:extLst>
+              <a:ext uri="{FF2B5EF4-FFF2-40B4-BE49-F238E27FC236}">
+                <a16:creationId xmlns:a16="http://schemas.microsoft.com/office/drawing/2014/main" id="{BFBB9D69-2A3F-333D-9105-E04FBA894DCF}"/>
+              </a:ext>
+            </a:extLst>
+          </p:cNvPr>
+          <p:cNvPicPr>
+            <a:picLocks noChangeAspect="1"/>
+          </p:cNvPicPr>
+          <p:nvPr/>
+        </p:nvPicPr>
+        <p:blipFill>
+          <a:blip r:embed="rId2"/>
+          <a:stretch>
+            <a:fillRect/>
+          </a:stretch>
+        </p:blipFill>
+        <p:spPr>
+          <a:xfrm>
+            <a:off x="3227724" y="1961467"/>
+            <a:ext cx="8964276" cy="4896533"/>
+          </a:xfrm>
+          <a:prstGeom prst="rect">
+            <a:avLst/>
+          </a:prstGeom>
+        </p:spPr>
+      </p:pic>
     </p:spTree>
     <p:extLst>
       <p:ext uri="{BB962C8B-B14F-4D97-AF65-F5344CB8AC3E}">
@@ -3472,6 +3683,42 @@
           </a:p>
         </p:txBody>
       </p:sp>
+      <p:pic>
+        <p:nvPicPr>
+          <p:cNvPr id="4" name="Picture 3">
+            <a:extLst>
+              <a:ext uri="{FF2B5EF4-FFF2-40B4-BE49-F238E27FC236}">
+                <a16:creationId xmlns:a16="http://schemas.microsoft.com/office/drawing/2014/main" id="{FAF55AC2-015A-09B4-A7E7-EC37948C824B}"/>
+              </a:ext>
+            </a:extLst>
+          </p:cNvPr>
+          <p:cNvPicPr>
+            <a:picLocks noChangeAspect="1"/>
+          </p:cNvPicPr>
+          <p:nvPr/>
+        </p:nvPicPr>
+        <p:blipFill>
+          <a:blip r:embed="rId2">
+            <a:extLst>
+              <a:ext uri="{28A0092B-C50C-407E-A947-70E740481C1C}">
+                <a14:useLocalDpi xmlns:a14="http://schemas.microsoft.com/office/drawing/2010/main" val="0"/>
+              </a:ext>
+            </a:extLst>
+          </a:blip>
+          <a:stretch>
+            <a:fillRect/>
+          </a:stretch>
+        </p:blipFill>
+        <p:spPr>
+          <a:xfrm>
+            <a:off x="298516" y="0"/>
+            <a:ext cx="11594968" cy="6858000"/>
+          </a:xfrm>
+          <a:prstGeom prst="rect">
+            <a:avLst/>
+          </a:prstGeom>
+        </p:spPr>
+      </p:pic>
     </p:spTree>
     <p:extLst>
       <p:ext uri="{BB962C8B-B14F-4D97-AF65-F5344CB8AC3E}">
@@ -3522,8 +3769,8 @@
         </p:nvSpPr>
         <p:spPr>
           <a:xfrm>
-            <a:off x="217714" y="255046"/>
-            <a:ext cx="11756571" cy="355354"/>
+            <a:off x="217715" y="255046"/>
+            <a:ext cx="2591474" cy="355354"/>
           </a:xfrm>
           <a:prstGeom prst="rect">
             <a:avLst/>
@@ -3543,21 +3790,54 @@
               <a:buNone/>
             </a:pPr>
             <a:r>
-              <a:rPr kumimoji="0" lang="en-US" altLang="en-US" sz="1300" b="0" i="0" u="none" strike="noStrike" cap="none" normalizeH="0" baseline="0">
-                <a:ln>
-                  <a:noFill/>
-                </a:ln>
-                <a:solidFill>
-                  <a:schemeClr val="tx1"/>
-                </a:solidFill>
-                <a:effectLst/>
+              <a:rPr lang="en-US" altLang="en-US" sz="1300">
                 <a:latin typeface="Arial" panose="020B0604020202020204" pitchFamily="34" charset="0"/>
               </a:rPr>
-              <a:t>.</a:t>
-            </a:r>
-          </a:p>
-        </p:txBody>
-      </p:sp>
+              <a:t>Multi data</a:t>
+            </a:r>
+            <a:endParaRPr kumimoji="0" lang="en-US" altLang="en-US" sz="1300" b="0" i="0" u="none" strike="noStrike" cap="none" normalizeH="0" baseline="0">
+              <a:ln>
+                <a:noFill/>
+              </a:ln>
+              <a:solidFill>
+                <a:schemeClr val="tx1"/>
+              </a:solidFill>
+              <a:effectLst/>
+              <a:latin typeface="Arial" panose="020B0604020202020204" pitchFamily="34" charset="0"/>
+            </a:endParaRPr>
+          </a:p>
+        </p:txBody>
+      </p:sp>
+      <p:pic>
+        <p:nvPicPr>
+          <p:cNvPr id="4" name="Picture 3">
+            <a:extLst>
+              <a:ext uri="{FF2B5EF4-FFF2-40B4-BE49-F238E27FC236}">
+                <a16:creationId xmlns:a16="http://schemas.microsoft.com/office/drawing/2014/main" id="{05F91803-9203-1B19-D28D-2B465F984DC4}"/>
+              </a:ext>
+            </a:extLst>
+          </p:cNvPr>
+          <p:cNvPicPr>
+            <a:picLocks noChangeAspect="1"/>
+          </p:cNvPicPr>
+          <p:nvPr/>
+        </p:nvPicPr>
+        <p:blipFill>
+          <a:blip r:embed="rId2"/>
+          <a:stretch>
+            <a:fillRect/>
+          </a:stretch>
+        </p:blipFill>
+        <p:spPr>
+          <a:xfrm>
+            <a:off x="3113408" y="370570"/>
+            <a:ext cx="9078592" cy="6487430"/>
+          </a:xfrm>
+          <a:prstGeom prst="rect">
+            <a:avLst/>
+          </a:prstGeom>
+        </p:spPr>
+      </p:pic>
     </p:spTree>
     <p:extLst>
       <p:ext uri="{BB962C8B-B14F-4D97-AF65-F5344CB8AC3E}">
@@ -3644,6 +3924,42 @@
           </a:p>
         </p:txBody>
       </p:sp>
+      <p:pic>
+        <p:nvPicPr>
+          <p:cNvPr id="4" name="Picture 3">
+            <a:extLst>
+              <a:ext uri="{FF2B5EF4-FFF2-40B4-BE49-F238E27FC236}">
+                <a16:creationId xmlns:a16="http://schemas.microsoft.com/office/drawing/2014/main" id="{638EDBBE-6551-5B5D-E556-6D63ACEF93C0}"/>
+              </a:ext>
+            </a:extLst>
+          </p:cNvPr>
+          <p:cNvPicPr>
+            <a:picLocks noChangeAspect="1"/>
+          </p:cNvPicPr>
+          <p:nvPr/>
+        </p:nvPicPr>
+        <p:blipFill>
+          <a:blip r:embed="rId2">
+            <a:extLst>
+              <a:ext uri="{28A0092B-C50C-407E-A947-70E740481C1C}">
+                <a14:useLocalDpi xmlns:a14="http://schemas.microsoft.com/office/drawing/2010/main" val="0"/>
+              </a:ext>
+            </a:extLst>
+          </a:blip>
+          <a:stretch>
+            <a:fillRect/>
+          </a:stretch>
+        </p:blipFill>
+        <p:spPr>
+          <a:xfrm>
+            <a:off x="292050" y="0"/>
+            <a:ext cx="11607899" cy="6858000"/>
+          </a:xfrm>
+          <a:prstGeom prst="rect">
+            <a:avLst/>
+          </a:prstGeom>
+        </p:spPr>
+      </p:pic>
     </p:spTree>
     <p:extLst>
       <p:ext uri="{BB962C8B-B14F-4D97-AF65-F5344CB8AC3E}">
@@ -3695,6 +4011,656 @@
         <p:spPr>
           <a:xfrm>
             <a:off x="217714" y="255046"/>
+            <a:ext cx="11756571" cy="5456750"/>
+          </a:xfrm>
+          <a:prstGeom prst="rect">
+            <a:avLst/>
+          </a:prstGeom>
+          <a:noFill/>
+        </p:spPr>
+        <p:txBody>
+          <a:bodyPr wrap="square">
+            <a:spAutoFit/>
+          </a:bodyPr>
+          <a:lstStyle/>
+          <a:p>
+            <a:pPr>
+              <a:lnSpc>
+                <a:spcPct val="150000"/>
+              </a:lnSpc>
+              <a:buNone/>
+            </a:pPr>
+            <a:r>
+              <a:rPr kumimoji="0" lang="en-US" altLang="en-US" sz="1300" b="1" i="0" u="none" strike="noStrike" cap="none" normalizeH="0" baseline="0">
+                <a:ln>
+                  <a:noFill/>
+                </a:ln>
+                <a:solidFill>
+                  <a:schemeClr val="tx1"/>
+                </a:solidFill>
+                <a:effectLst/>
+                <a:latin typeface="Arial" panose="020B0604020202020204" pitchFamily="34" charset="0"/>
+              </a:rPr>
+              <a:t>Vacib Qeydlər</a:t>
+            </a:r>
+            <a:r>
+              <a:rPr kumimoji="0" lang="en-US" altLang="en-US" sz="1300" b="0" i="0" u="none" strike="noStrike" cap="none" normalizeH="0" baseline="0">
+                <a:ln>
+                  <a:noFill/>
+                </a:ln>
+                <a:solidFill>
+                  <a:schemeClr val="tx1"/>
+                </a:solidFill>
+                <a:effectLst/>
+                <a:latin typeface="Arial" panose="020B0604020202020204" pitchFamily="34" charset="0"/>
+              </a:rPr>
+              <a:t>:</a:t>
+            </a:r>
+          </a:p>
+          <a:p>
+            <a:pPr>
+              <a:lnSpc>
+                <a:spcPct val="150000"/>
+              </a:lnSpc>
+              <a:buNone/>
+            </a:pPr>
+            <a:r>
+              <a:rPr kumimoji="0" lang="en-US" altLang="en-US" sz="1300" b="1" i="0" u="none" strike="noStrike" cap="none" normalizeH="0" baseline="0">
+                <a:ln>
+                  <a:noFill/>
+                </a:ln>
+                <a:solidFill>
+                  <a:srgbClr val="FF0000"/>
+                </a:solidFill>
+                <a:effectLst/>
+                <a:latin typeface="Arial" panose="020B0604020202020204" pitchFamily="34" charset="0"/>
+              </a:rPr>
+              <a:t>insert() </a:t>
+            </a:r>
+            <a:r>
+              <a:rPr kumimoji="0" lang="en-US" altLang="en-US" sz="1300" b="0" i="0" u="none" strike="noStrike" cap="none" normalizeH="0" baseline="0">
+                <a:ln>
+                  <a:noFill/>
+                </a:ln>
+                <a:solidFill>
+                  <a:schemeClr val="tx1"/>
+                </a:solidFill>
+                <a:effectLst/>
+                <a:latin typeface="Arial" panose="020B0604020202020204" pitchFamily="34" charset="0"/>
+              </a:rPr>
+              <a:t>metodu true/false qaytarır. Əgər əlavə etmə uğurludursa true, yoxdursa false.</a:t>
+            </a:r>
+          </a:p>
+          <a:p>
+            <a:pPr>
+              <a:lnSpc>
+                <a:spcPct val="150000"/>
+              </a:lnSpc>
+              <a:buNone/>
+            </a:pPr>
+            <a:endParaRPr kumimoji="0" lang="en-US" altLang="en-US" sz="1300" b="0" i="0" u="none" strike="noStrike" cap="none" normalizeH="0" baseline="0">
+              <a:ln>
+                <a:noFill/>
+              </a:ln>
+              <a:solidFill>
+                <a:schemeClr val="tx1"/>
+              </a:solidFill>
+              <a:effectLst/>
+              <a:latin typeface="Arial" panose="020B0604020202020204" pitchFamily="34" charset="0"/>
+            </a:endParaRPr>
+          </a:p>
+          <a:p>
+            <a:pPr>
+              <a:lnSpc>
+                <a:spcPct val="150000"/>
+              </a:lnSpc>
+              <a:buNone/>
+            </a:pPr>
+            <a:r>
+              <a:rPr kumimoji="0" lang="en-US" altLang="en-US" sz="1300" b="0" i="0" u="none" strike="noStrike" cap="none" normalizeH="0" baseline="0">
+                <a:ln>
+                  <a:noFill/>
+                </a:ln>
+                <a:solidFill>
+                  <a:schemeClr val="tx1"/>
+                </a:solidFill>
+                <a:effectLst/>
+                <a:latin typeface="Arial" panose="020B0604020202020204" pitchFamily="34" charset="0"/>
+              </a:rPr>
+              <a:t>Bu metodla əlavə etdikdən sonra əlavə edilən </a:t>
+            </a:r>
+            <a:r>
+              <a:rPr kumimoji="0" lang="en-US" altLang="en-US" sz="1300" b="1" i="0" u="none" strike="noStrike" cap="none" normalizeH="0" baseline="0">
+                <a:ln>
+                  <a:noFill/>
+                </a:ln>
+                <a:solidFill>
+                  <a:srgbClr val="FF0000"/>
+                </a:solidFill>
+                <a:effectLst/>
+                <a:latin typeface="Arial" panose="020B0604020202020204" pitchFamily="34" charset="0"/>
+              </a:rPr>
+              <a:t>id</a:t>
+            </a:r>
+            <a:r>
+              <a:rPr kumimoji="0" lang="en-US" altLang="en-US" sz="1300" b="0" i="0" u="none" strike="noStrike" cap="none" normalizeH="0" baseline="0">
+                <a:ln>
+                  <a:noFill/>
+                </a:ln>
+                <a:solidFill>
+                  <a:schemeClr val="tx1"/>
+                </a:solidFill>
+                <a:effectLst/>
+                <a:latin typeface="Arial" panose="020B0604020202020204" pitchFamily="34" charset="0"/>
+              </a:rPr>
+              <a:t>-ni öyrənmək olmur.</a:t>
+            </a:r>
+          </a:p>
+          <a:p>
+            <a:pPr>
+              <a:lnSpc>
+                <a:spcPct val="150000"/>
+              </a:lnSpc>
+              <a:buNone/>
+            </a:pPr>
+            <a:endParaRPr kumimoji="0" lang="en-US" altLang="en-US" sz="1300" b="0" i="0" u="none" strike="noStrike" cap="none" normalizeH="0" baseline="0">
+              <a:ln>
+                <a:noFill/>
+              </a:ln>
+              <a:solidFill>
+                <a:schemeClr val="tx1"/>
+              </a:solidFill>
+              <a:effectLst/>
+              <a:latin typeface="Arial" panose="020B0604020202020204" pitchFamily="34" charset="0"/>
+            </a:endParaRPr>
+          </a:p>
+          <a:p>
+            <a:pPr>
+              <a:lnSpc>
+                <a:spcPct val="150000"/>
+              </a:lnSpc>
+              <a:buNone/>
+            </a:pPr>
+            <a:r>
+              <a:rPr kumimoji="0" lang="en-US" altLang="en-US" sz="1300" b="0" i="0" u="none" strike="noStrike" cap="none" normalizeH="0" baseline="0">
+                <a:ln>
+                  <a:noFill/>
+                </a:ln>
+                <a:solidFill>
+                  <a:schemeClr val="tx1"/>
+                </a:solidFill>
+                <a:effectLst/>
+                <a:latin typeface="Arial" panose="020B0604020202020204" pitchFamily="34" charset="0"/>
+              </a:rPr>
+              <a:t>Əgər əlavə edilən </a:t>
+            </a:r>
+            <a:r>
+              <a:rPr kumimoji="0" lang="en-US" altLang="en-US" sz="1300" b="1" i="0" u="none" strike="noStrike" cap="none" normalizeH="0" baseline="0">
+                <a:ln>
+                  <a:noFill/>
+                </a:ln>
+                <a:solidFill>
+                  <a:schemeClr val="tx1"/>
+                </a:solidFill>
+                <a:effectLst/>
+                <a:latin typeface="Arial" panose="020B0604020202020204" pitchFamily="34" charset="0"/>
+              </a:rPr>
+              <a:t>id</a:t>
+            </a:r>
+            <a:r>
+              <a:rPr kumimoji="0" lang="en-US" altLang="en-US" sz="1300" b="0" i="0" u="none" strike="noStrike" cap="none" normalizeH="0" baseline="0">
+                <a:ln>
+                  <a:noFill/>
+                </a:ln>
+                <a:solidFill>
+                  <a:schemeClr val="tx1"/>
+                </a:solidFill>
+                <a:effectLst/>
+                <a:latin typeface="Arial" panose="020B0604020202020204" pitchFamily="34" charset="0"/>
+              </a:rPr>
+              <a:t>-ni almaq istəyirsənsə, onun üçün başqa metoddan istifadə etməlisən (aşağıda izah olunub).</a:t>
+            </a:r>
+          </a:p>
+          <a:p>
+            <a:pPr>
+              <a:lnSpc>
+                <a:spcPct val="150000"/>
+              </a:lnSpc>
+              <a:buNone/>
+            </a:pPr>
+            <a:endParaRPr kumimoji="0" lang="en-US" altLang="en-US" sz="1300" b="0" i="0" u="none" strike="noStrike" cap="none" normalizeH="0" baseline="0">
+              <a:ln>
+                <a:noFill/>
+              </a:ln>
+              <a:solidFill>
+                <a:schemeClr val="tx1"/>
+              </a:solidFill>
+              <a:effectLst/>
+              <a:latin typeface="Arial" panose="020B0604020202020204" pitchFamily="34" charset="0"/>
+            </a:endParaRPr>
+          </a:p>
+          <a:p>
+            <a:pPr>
+              <a:lnSpc>
+                <a:spcPct val="150000"/>
+              </a:lnSpc>
+              <a:buNone/>
+            </a:pPr>
+            <a:endParaRPr kumimoji="0" lang="en-US" altLang="en-US" sz="1300" b="0" i="0" u="none" strike="noStrike" cap="none" normalizeH="0" baseline="0">
+              <a:ln>
+                <a:noFill/>
+              </a:ln>
+              <a:solidFill>
+                <a:schemeClr val="tx1"/>
+              </a:solidFill>
+              <a:effectLst/>
+              <a:latin typeface="Arial" panose="020B0604020202020204" pitchFamily="34" charset="0"/>
+            </a:endParaRPr>
+          </a:p>
+          <a:p>
+            <a:pPr>
+              <a:lnSpc>
+                <a:spcPct val="150000"/>
+              </a:lnSpc>
+              <a:buNone/>
+            </a:pPr>
+            <a:endParaRPr kumimoji="0" lang="en-US" altLang="en-US" sz="1300" b="0" i="0" u="none" strike="noStrike" cap="none" normalizeH="0" baseline="0">
+              <a:ln>
+                <a:noFill/>
+              </a:ln>
+              <a:solidFill>
+                <a:schemeClr val="tx1"/>
+              </a:solidFill>
+              <a:effectLst/>
+              <a:latin typeface="Arial" panose="020B0604020202020204" pitchFamily="34" charset="0"/>
+            </a:endParaRPr>
+          </a:p>
+          <a:p>
+            <a:pPr>
+              <a:lnSpc>
+                <a:spcPct val="150000"/>
+              </a:lnSpc>
+              <a:buNone/>
+            </a:pPr>
+            <a:r>
+              <a:rPr kumimoji="0" lang="en-US" altLang="en-US" sz="1300" b="0" i="0" u="none" strike="noStrike" cap="none" normalizeH="0" baseline="0">
+                <a:ln>
+                  <a:noFill/>
+                </a:ln>
+                <a:solidFill>
+                  <a:schemeClr val="tx1"/>
+                </a:solidFill>
+                <a:effectLst/>
+                <a:latin typeface="Arial" panose="020B0604020202020204" pitchFamily="34" charset="0"/>
+              </a:rPr>
+              <a:t>Əlavə edilmiş </a:t>
+            </a:r>
+            <a:r>
+              <a:rPr kumimoji="0" lang="en-US" altLang="en-US" sz="1300" b="1" i="0" u="none" strike="noStrike" cap="none" normalizeH="0" baseline="0">
+                <a:ln>
+                  <a:noFill/>
+                </a:ln>
+                <a:solidFill>
+                  <a:schemeClr val="tx1"/>
+                </a:solidFill>
+                <a:effectLst/>
+                <a:latin typeface="Arial" panose="020B0604020202020204" pitchFamily="34" charset="0"/>
+              </a:rPr>
+              <a:t>ID</a:t>
+            </a:r>
+            <a:r>
+              <a:rPr kumimoji="0" lang="en-US" altLang="en-US" sz="1300" b="0" i="0" u="none" strike="noStrike" cap="none" normalizeH="0" baseline="0">
+                <a:ln>
+                  <a:noFill/>
+                </a:ln>
+                <a:solidFill>
+                  <a:schemeClr val="tx1"/>
+                </a:solidFill>
+                <a:effectLst/>
+                <a:latin typeface="Arial" panose="020B0604020202020204" pitchFamily="34" charset="0"/>
+              </a:rPr>
+              <a:t>-ni almaq – </a:t>
+            </a:r>
+            <a:r>
+              <a:rPr kumimoji="0" lang="en-US" altLang="en-US" sz="1300" b="1" i="0" u="none" strike="noStrike" cap="none" normalizeH="0" baseline="0">
+                <a:ln>
+                  <a:noFill/>
+                </a:ln>
+                <a:solidFill>
+                  <a:srgbClr val="FF0000"/>
+                </a:solidFill>
+                <a:effectLst/>
+                <a:latin typeface="Arial" panose="020B0604020202020204" pitchFamily="34" charset="0"/>
+              </a:rPr>
+              <a:t>insertGetId()</a:t>
+            </a:r>
+          </a:p>
+          <a:p>
+            <a:pPr>
+              <a:lnSpc>
+                <a:spcPct val="150000"/>
+              </a:lnSpc>
+              <a:buNone/>
+            </a:pPr>
+            <a:r>
+              <a:rPr kumimoji="0" lang="en-US" altLang="en-US" sz="1300" b="0" i="0" u="none" strike="noStrike" cap="none" normalizeH="0" baseline="0">
+                <a:ln>
+                  <a:noFill/>
+                </a:ln>
+                <a:solidFill>
+                  <a:schemeClr val="tx1"/>
+                </a:solidFill>
+                <a:effectLst/>
+                <a:latin typeface="Arial" panose="020B0604020202020204" pitchFamily="34" charset="0"/>
+              </a:rPr>
+              <a:t>Əgər insert etdikdən sonra əlavə edilmiş id dəyərini almaq istəyirsənsə: Bu, çox istifadə olunan bir texnikadır, xüsusilə başqa cədvəllərlə əlaqə qurulanda.</a:t>
+            </a:r>
+          </a:p>
+          <a:p>
+            <a:pPr>
+              <a:lnSpc>
+                <a:spcPct val="150000"/>
+              </a:lnSpc>
+              <a:buNone/>
+            </a:pPr>
+            <a:endParaRPr kumimoji="0" lang="en-US" altLang="en-US" sz="1300" b="0" i="0" u="none" strike="noStrike" cap="none" normalizeH="0" baseline="0">
+              <a:ln>
+                <a:noFill/>
+              </a:ln>
+              <a:solidFill>
+                <a:schemeClr val="tx1"/>
+              </a:solidFill>
+              <a:effectLst/>
+              <a:latin typeface="Arial" panose="020B0604020202020204" pitchFamily="34" charset="0"/>
+            </a:endParaRPr>
+          </a:p>
+          <a:p>
+            <a:pPr>
+              <a:lnSpc>
+                <a:spcPct val="150000"/>
+              </a:lnSpc>
+              <a:buNone/>
+            </a:pPr>
+            <a:endParaRPr kumimoji="0" lang="en-US" altLang="en-US" sz="1300" b="0" i="0" u="none" strike="noStrike" cap="none" normalizeH="0" baseline="0">
+              <a:ln>
+                <a:noFill/>
+              </a:ln>
+              <a:solidFill>
+                <a:schemeClr val="tx1"/>
+              </a:solidFill>
+              <a:effectLst/>
+              <a:latin typeface="Arial" panose="020B0604020202020204" pitchFamily="34" charset="0"/>
+            </a:endParaRPr>
+          </a:p>
+          <a:p>
+            <a:pPr>
+              <a:lnSpc>
+                <a:spcPct val="150000"/>
+              </a:lnSpc>
+              <a:buNone/>
+            </a:pPr>
+            <a:endParaRPr lang="en-US" altLang="en-US" sz="1300">
+              <a:latin typeface="Arial" panose="020B0604020202020204" pitchFamily="34" charset="0"/>
+            </a:endParaRPr>
+          </a:p>
+          <a:p>
+            <a:pPr>
+              <a:lnSpc>
+                <a:spcPct val="150000"/>
+              </a:lnSpc>
+              <a:buNone/>
+            </a:pPr>
+            <a:r>
+              <a:rPr kumimoji="0" lang="en-US" altLang="en-US" sz="1300" b="1" i="0" u="none" strike="noStrike" cap="none" normalizeH="0" baseline="0">
+                <a:ln>
+                  <a:noFill/>
+                </a:ln>
+                <a:solidFill>
+                  <a:srgbClr val="00B050"/>
+                </a:solidFill>
+                <a:effectLst/>
+                <a:latin typeface="Arial" panose="020B0604020202020204" pitchFamily="34" charset="0"/>
+              </a:rPr>
+              <a:t>Təhlükəsizlik</a:t>
+            </a:r>
+          </a:p>
+          <a:p>
+            <a:pPr>
+              <a:lnSpc>
+                <a:spcPct val="150000"/>
+              </a:lnSpc>
+              <a:buNone/>
+            </a:pPr>
+            <a:r>
+              <a:rPr kumimoji="0" lang="en-US" altLang="en-US" sz="1300" b="0" i="0" u="none" strike="noStrike" cap="none" normalizeH="0" baseline="0">
+                <a:ln>
+                  <a:noFill/>
+                </a:ln>
+                <a:solidFill>
+                  <a:schemeClr val="tx1"/>
+                </a:solidFill>
+                <a:effectLst/>
+                <a:latin typeface="Arial" panose="020B0604020202020204" pitchFamily="34" charset="0"/>
+              </a:rPr>
+              <a:t>Laravel </a:t>
+            </a:r>
+            <a:r>
+              <a:rPr kumimoji="0" lang="en-US" altLang="en-US" sz="1300" b="1" i="0" u="none" strike="noStrike" cap="none" normalizeH="0" baseline="0">
+                <a:ln>
+                  <a:noFill/>
+                </a:ln>
+                <a:solidFill>
+                  <a:schemeClr val="tx1"/>
+                </a:solidFill>
+                <a:effectLst/>
+                <a:latin typeface="Arial" panose="020B0604020202020204" pitchFamily="34" charset="0"/>
+              </a:rPr>
+              <a:t>insert() </a:t>
+            </a:r>
+            <a:r>
+              <a:rPr kumimoji="0" lang="en-US" altLang="en-US" sz="1300" b="0" i="0" u="none" strike="noStrike" cap="none" normalizeH="0" baseline="0">
+                <a:ln>
+                  <a:noFill/>
+                </a:ln>
+                <a:solidFill>
+                  <a:schemeClr val="tx1"/>
+                </a:solidFill>
+                <a:effectLst/>
+                <a:latin typeface="Arial" panose="020B0604020202020204" pitchFamily="34" charset="0"/>
+              </a:rPr>
+              <a:t>metodu da </a:t>
+            </a:r>
+            <a:r>
+              <a:rPr kumimoji="0" lang="en-US" altLang="en-US" sz="1300" b="1" i="0" u="none" strike="noStrike" cap="none" normalizeH="0" baseline="0">
+                <a:ln>
+                  <a:noFill/>
+                </a:ln>
+                <a:solidFill>
+                  <a:schemeClr val="tx1"/>
+                </a:solidFill>
+                <a:effectLst/>
+                <a:latin typeface="Arial" panose="020B0604020202020204" pitchFamily="34" charset="0"/>
+              </a:rPr>
+              <a:t>PDO</a:t>
+            </a:r>
+            <a:r>
+              <a:rPr kumimoji="0" lang="en-US" altLang="en-US" sz="1300" b="0" i="0" u="none" strike="noStrike" cap="none" normalizeH="0" baseline="0">
+                <a:ln>
+                  <a:noFill/>
+                </a:ln>
+                <a:solidFill>
+                  <a:schemeClr val="tx1"/>
+                </a:solidFill>
+                <a:effectLst/>
+                <a:latin typeface="Arial" panose="020B0604020202020204" pitchFamily="34" charset="0"/>
+              </a:rPr>
+              <a:t> binding istifadə etdiyi üçün </a:t>
+            </a:r>
+          </a:p>
+          <a:p>
+            <a:pPr>
+              <a:lnSpc>
+                <a:spcPct val="150000"/>
+              </a:lnSpc>
+              <a:buNone/>
+            </a:pPr>
+            <a:r>
+              <a:rPr kumimoji="0" lang="en-US" altLang="en-US" sz="1300" b="1" i="0" u="none" strike="noStrike" cap="none" normalizeH="0" baseline="0">
+                <a:ln>
+                  <a:noFill/>
+                </a:ln>
+                <a:solidFill>
+                  <a:schemeClr val="tx1"/>
+                </a:solidFill>
+                <a:effectLst/>
+                <a:latin typeface="Arial" panose="020B0604020202020204" pitchFamily="34" charset="0"/>
+              </a:rPr>
+              <a:t>SQL Injection</a:t>
+            </a:r>
+            <a:r>
+              <a:rPr kumimoji="0" lang="en-US" altLang="en-US" sz="1300" b="0" i="0" u="none" strike="noStrike" cap="none" normalizeH="0" baseline="0">
+                <a:ln>
+                  <a:noFill/>
+                </a:ln>
+                <a:solidFill>
+                  <a:schemeClr val="tx1"/>
+                </a:solidFill>
+                <a:effectLst/>
+                <a:latin typeface="Arial" panose="020B0604020202020204" pitchFamily="34" charset="0"/>
+              </a:rPr>
+              <a:t>-a qarşı təhlükəsizdir. Dəyərləri array şəklində </a:t>
+            </a:r>
+          </a:p>
+          <a:p>
+            <a:pPr>
+              <a:lnSpc>
+                <a:spcPct val="150000"/>
+              </a:lnSpc>
+              <a:buNone/>
+            </a:pPr>
+            <a:r>
+              <a:rPr kumimoji="0" lang="en-US" altLang="en-US" sz="1300" b="0" i="0" u="none" strike="noStrike" cap="none" normalizeH="0" baseline="0">
+                <a:ln>
+                  <a:noFill/>
+                </a:ln>
+                <a:solidFill>
+                  <a:schemeClr val="tx1"/>
+                </a:solidFill>
+                <a:effectLst/>
+                <a:latin typeface="Arial" panose="020B0604020202020204" pitchFamily="34" charset="0"/>
+              </a:rPr>
+              <a:t>verdiyimiz üçün heç bir təmizləmə (</a:t>
+            </a:r>
+            <a:r>
+              <a:rPr kumimoji="0" lang="en-US" altLang="en-US" sz="1300" b="1" i="0" u="none" strike="noStrike" cap="none" normalizeH="0" baseline="0">
+                <a:ln>
+                  <a:noFill/>
+                </a:ln>
+                <a:solidFill>
+                  <a:schemeClr val="tx1"/>
+                </a:solidFill>
+                <a:effectLst/>
+                <a:latin typeface="Arial" panose="020B0604020202020204" pitchFamily="34" charset="0"/>
+              </a:rPr>
+              <a:t>sanitize</a:t>
+            </a:r>
+            <a:r>
+              <a:rPr kumimoji="0" lang="en-US" altLang="en-US" sz="1300" b="0" i="0" u="none" strike="noStrike" cap="none" normalizeH="0" baseline="0">
+                <a:ln>
+                  <a:noFill/>
+                </a:ln>
+                <a:solidFill>
+                  <a:schemeClr val="tx1"/>
+                </a:solidFill>
+                <a:effectLst/>
+                <a:latin typeface="Arial" panose="020B0604020202020204" pitchFamily="34" charset="0"/>
+              </a:rPr>
+              <a:t>) lazım deyil.</a:t>
+            </a:r>
+          </a:p>
+        </p:txBody>
+      </p:sp>
+      <p:pic>
+        <p:nvPicPr>
+          <p:cNvPr id="4" name="Picture 3">
+            <a:extLst>
+              <a:ext uri="{FF2B5EF4-FFF2-40B4-BE49-F238E27FC236}">
+                <a16:creationId xmlns:a16="http://schemas.microsoft.com/office/drawing/2014/main" id="{E701D3B9-4B6B-D854-F3AC-9FC660D99031}"/>
+              </a:ext>
+            </a:extLst>
+          </p:cNvPr>
+          <p:cNvPicPr>
+            <a:picLocks noChangeAspect="1"/>
+          </p:cNvPicPr>
+          <p:nvPr/>
+        </p:nvPicPr>
+        <p:blipFill>
+          <a:blip r:embed="rId2"/>
+          <a:stretch>
+            <a:fillRect/>
+          </a:stretch>
+        </p:blipFill>
+        <p:spPr>
+          <a:xfrm>
+            <a:off x="6504781" y="3952470"/>
+            <a:ext cx="5687219" cy="2905530"/>
+          </a:xfrm>
+          <a:prstGeom prst="rect">
+            <a:avLst/>
+          </a:prstGeom>
+        </p:spPr>
+      </p:pic>
+    </p:spTree>
+    <p:extLst>
+      <p:ext uri="{BB962C8B-B14F-4D97-AF65-F5344CB8AC3E}">
+        <p14:creationId xmlns:p14="http://schemas.microsoft.com/office/powerpoint/2010/main" val="3095838342"/>
+      </p:ext>
+    </p:extLst>
+  </p:cSld>
+  <p:clrMapOvr>
+    <a:masterClrMapping/>
+  </p:clrMapOvr>
+</p:sld>
+</file>
+
+<file path=ppt/slides/slide6.xml><?xml version="1.0" encoding="utf-8"?>
+<p:sld xmlns:a="http://schemas.openxmlformats.org/drawingml/2006/main" xmlns:r="http://schemas.openxmlformats.org/officeDocument/2006/relationships" xmlns:p="http://schemas.openxmlformats.org/presentationml/2006/main">
+  <p:cSld>
+    <p:spTree>
+      <p:nvGrpSpPr>
+        <p:cNvPr id="1" name="">
+          <a:extLst>
+            <a:ext uri="{FF2B5EF4-FFF2-40B4-BE49-F238E27FC236}">
+              <a16:creationId xmlns:a16="http://schemas.microsoft.com/office/drawing/2014/main" id="{0D6D39F0-E2BE-544C-6DE4-ED667DF73AC0}"/>
+            </a:ext>
+          </a:extLst>
+        </p:cNvPr>
+        <p:cNvGrpSpPr/>
+        <p:nvPr/>
+      </p:nvGrpSpPr>
+      <p:grpSpPr>
+        <a:xfrm>
+          <a:off x="0" y="0"/>
+          <a:ext cx="0" cy="0"/>
+          <a:chOff x="0" y="0"/>
+          <a:chExt cx="0" cy="0"/>
+        </a:xfrm>
+      </p:grpSpPr>
+      <p:sp>
+        <p:nvSpPr>
+          <p:cNvPr id="3" name="TextBox 2">
+            <a:extLst>
+              <a:ext uri="{FF2B5EF4-FFF2-40B4-BE49-F238E27FC236}">
+                <a16:creationId xmlns:a16="http://schemas.microsoft.com/office/drawing/2014/main" id="{FDE28106-8353-D23F-3F93-ED499840503A}"/>
+              </a:ext>
+            </a:extLst>
+          </p:cNvPr>
+          <p:cNvSpPr txBox="1"/>
+          <p:nvPr/>
+        </p:nvSpPr>
+        <p:spPr>
+          <a:xfrm>
+            <a:off x="217714" y="255046"/>
             <a:ext cx="11756571" cy="355354"/>
           </a:xfrm>
           <a:prstGeom prst="rect">
@@ -3733,7 +4699,93 @@
     </p:spTree>
     <p:extLst>
       <p:ext uri="{BB962C8B-B14F-4D97-AF65-F5344CB8AC3E}">
-        <p14:creationId xmlns:p14="http://schemas.microsoft.com/office/powerpoint/2010/main" val="3095838342"/>
+        <p14:creationId xmlns:p14="http://schemas.microsoft.com/office/powerpoint/2010/main" val="3987319739"/>
+      </p:ext>
+    </p:extLst>
+  </p:cSld>
+  <p:clrMapOvr>
+    <a:masterClrMapping/>
+  </p:clrMapOvr>
+</p:sld>
+</file>
+
+<file path=ppt/slides/slide7.xml><?xml version="1.0" encoding="utf-8"?>
+<p:sld xmlns:a="http://schemas.openxmlformats.org/drawingml/2006/main" xmlns:r="http://schemas.openxmlformats.org/officeDocument/2006/relationships" xmlns:p="http://schemas.openxmlformats.org/presentationml/2006/main">
+  <p:cSld>
+    <p:spTree>
+      <p:nvGrpSpPr>
+        <p:cNvPr id="1" name="">
+          <a:extLst>
+            <a:ext uri="{FF2B5EF4-FFF2-40B4-BE49-F238E27FC236}">
+              <a16:creationId xmlns:a16="http://schemas.microsoft.com/office/drawing/2014/main" id="{15A743F5-D6D5-DA49-9559-CEDFDA42B46A}"/>
+            </a:ext>
+          </a:extLst>
+        </p:cNvPr>
+        <p:cNvGrpSpPr/>
+        <p:nvPr/>
+      </p:nvGrpSpPr>
+      <p:grpSpPr>
+        <a:xfrm>
+          <a:off x="0" y="0"/>
+          <a:ext cx="0" cy="0"/>
+          <a:chOff x="0" y="0"/>
+          <a:chExt cx="0" cy="0"/>
+        </a:xfrm>
+      </p:grpSpPr>
+      <p:sp>
+        <p:nvSpPr>
+          <p:cNvPr id="3" name="TextBox 2">
+            <a:extLst>
+              <a:ext uri="{FF2B5EF4-FFF2-40B4-BE49-F238E27FC236}">
+                <a16:creationId xmlns:a16="http://schemas.microsoft.com/office/drawing/2014/main" id="{D191CB23-2894-D806-5FEC-AAA8735B51D2}"/>
+              </a:ext>
+            </a:extLst>
+          </p:cNvPr>
+          <p:cNvSpPr txBox="1"/>
+          <p:nvPr/>
+        </p:nvSpPr>
+        <p:spPr>
+          <a:xfrm>
+            <a:off x="217714" y="255046"/>
+            <a:ext cx="11756571" cy="355354"/>
+          </a:xfrm>
+          <a:prstGeom prst="rect">
+            <a:avLst/>
+          </a:prstGeom>
+          <a:noFill/>
+        </p:spPr>
+        <p:txBody>
+          <a:bodyPr wrap="square">
+            <a:spAutoFit/>
+          </a:bodyPr>
+          <a:lstStyle/>
+          <a:p>
+            <a:pPr>
+              <a:lnSpc>
+                <a:spcPct val="150000"/>
+              </a:lnSpc>
+              <a:buNone/>
+            </a:pPr>
+            <a:r>
+              <a:rPr kumimoji="0" lang="en-US" altLang="en-US" sz="1300" b="0" i="0" u="none" strike="noStrike" cap="none" normalizeH="0" baseline="0">
+                <a:ln>
+                  <a:noFill/>
+                </a:ln>
+                <a:solidFill>
+                  <a:schemeClr val="tx1"/>
+                </a:solidFill>
+                <a:effectLst/>
+                <a:latin typeface="Arial" panose="020B0604020202020204" pitchFamily="34" charset="0"/>
+              </a:rPr>
+              <a:t>.</a:t>
+            </a:r>
+          </a:p>
+        </p:txBody>
+      </p:sp>
+    </p:spTree>
+    <p:extLst>
+      <p:ext uri="{BB962C8B-B14F-4D97-AF65-F5344CB8AC3E}">
+        <p14:creationId xmlns:p14="http://schemas.microsoft.com/office/powerpoint/2010/main" val="3235626362"/>
       </p:ext>
     </p:extLst>
   </p:cSld>

</xml_diff>

<commit_message>
Update Data In Database
</commit_message>
<xml_diff>
--- a/.lessons/16 Fundamental. Database - Query Builder/5 Insert Data In Database/1.pptx
+++ b/.lessons/16 Fundamental. Database - Query Builder/5 Insert Data In Database/1.pptx
@@ -4088,7 +4088,85 @@
                 <a:effectLst/>
                 <a:latin typeface="Arial" panose="020B0604020202020204" pitchFamily="34" charset="0"/>
               </a:rPr>
-              <a:t>metodu true/false qaytarır. Əgər əlavə etmə uğurludursa true, yoxdursa false.</a:t>
+              <a:t>metodu </a:t>
+            </a:r>
+            <a:r>
+              <a:rPr kumimoji="0" lang="en-US" altLang="en-US" sz="1300" b="1" i="0" u="none" strike="noStrike" cap="none" normalizeH="0" baseline="0">
+                <a:ln>
+                  <a:noFill/>
+                </a:ln>
+                <a:solidFill>
+                  <a:schemeClr val="tx1"/>
+                </a:solidFill>
+                <a:effectLst/>
+                <a:latin typeface="Arial" panose="020B0604020202020204" pitchFamily="34" charset="0"/>
+              </a:rPr>
+              <a:t>true/false </a:t>
+            </a:r>
+            <a:r>
+              <a:rPr kumimoji="0" lang="en-US" altLang="en-US" sz="1300" b="0" i="0" u="none" strike="noStrike" cap="none" normalizeH="0" baseline="0">
+                <a:ln>
+                  <a:noFill/>
+                </a:ln>
+                <a:solidFill>
+                  <a:schemeClr val="tx1"/>
+                </a:solidFill>
+                <a:effectLst/>
+                <a:latin typeface="Arial" panose="020B0604020202020204" pitchFamily="34" charset="0"/>
+              </a:rPr>
+              <a:t>qaytarır. Əgər əlavə etmə uğurludursa </a:t>
+            </a:r>
+            <a:r>
+              <a:rPr kumimoji="0" lang="en-US" altLang="en-US" sz="1300" b="1" i="0" u="none" strike="noStrike" cap="none" normalizeH="0" baseline="0">
+                <a:ln>
+                  <a:noFill/>
+                </a:ln>
+                <a:solidFill>
+                  <a:schemeClr val="tx1"/>
+                </a:solidFill>
+                <a:effectLst/>
+                <a:latin typeface="Arial" panose="020B0604020202020204" pitchFamily="34" charset="0"/>
+              </a:rPr>
+              <a:t>true</a:t>
+            </a:r>
+            <a:r>
+              <a:rPr kumimoji="0" lang="en-US" altLang="en-US" sz="1300" b="0" i="0" u="none" strike="noStrike" cap="none" normalizeH="0" baseline="0">
+                <a:ln>
+                  <a:noFill/>
+                </a:ln>
+                <a:solidFill>
+                  <a:schemeClr val="tx1"/>
+                </a:solidFill>
+                <a:effectLst/>
+                <a:latin typeface="Arial" panose="020B0604020202020204" pitchFamily="34" charset="0"/>
+              </a:rPr>
+              <a:t>, yoxdursa </a:t>
+            </a:r>
+            <a:r>
+              <a:rPr kumimoji="0" lang="en-US" altLang="en-US" sz="1300" b="1" i="0" u="none" strike="noStrike" cap="none" normalizeH="0" baseline="0">
+                <a:ln>
+                  <a:noFill/>
+                </a:ln>
+                <a:solidFill>
+                  <a:schemeClr val="tx1"/>
+                </a:solidFill>
+                <a:effectLst/>
+                <a:latin typeface="Arial" panose="020B0604020202020204" pitchFamily="34" charset="0"/>
+              </a:rPr>
+              <a:t>false</a:t>
+            </a:r>
+            <a:r>
+              <a:rPr kumimoji="0" lang="en-US" altLang="en-US" sz="1300" b="0" i="0" u="none" strike="noStrike" cap="none" normalizeH="0" baseline="0">
+                <a:ln>
+                  <a:noFill/>
+                </a:ln>
+                <a:solidFill>
+                  <a:schemeClr val="tx1"/>
+                </a:solidFill>
+                <a:effectLst/>
+                <a:latin typeface="Arial" panose="020B0604020202020204" pitchFamily="34" charset="0"/>
+              </a:rPr>
+              <a:t>.</a:t>
             </a:r>
           </a:p>
           <a:p>

</xml_diff>